<commit_message>
Small changes to power point
</commit_message>
<xml_diff>
--- a/Presentation/Spiral3.pptx
+++ b/Presentation/Spiral3.pptx
@@ -6411,11 +6411,7 @@
           <a:p>
             <a:r>
               <a:rPr lang="en-US" dirty="0" smtClean="0"/>
-              <a:t>Admin Panel</a:t>
-            </a:r>
-            <a:r>
-              <a:rPr lang="en-US" smtClean="0"/>
-              <a:t>: Banning a user</a:t>
+              <a:t>Admin Panel: Banning a user</a:t>
             </a:r>
             <a:endParaRPr lang="en-US" dirty="0" smtClean="0"/>
           </a:p>
@@ -6624,49 +6620,9 @@
           <a:p>
             <a:r>
               <a:rPr lang="en-US" dirty="0" smtClean="0"/>
-              <a:t>Admin users</a:t>
-            </a:r>
-          </a:p>
-          <a:p>
-            <a:pPr lvl="1"/>
-            <a:r>
-              <a:rPr lang="en-US" dirty="0" smtClean="0"/>
-              <a:t>Administrative panel</a:t>
-            </a:r>
-          </a:p>
-          <a:p>
-            <a:pPr lvl="1"/>
-            <a:r>
-              <a:rPr lang="en-US" dirty="0" smtClean="0"/>
-              <a:t>User Dispute Review</a:t>
-            </a:r>
-          </a:p>
-          <a:p>
-            <a:r>
-              <a:rPr lang="en-US" dirty="0" smtClean="0"/>
-              <a:t>User Profile Page</a:t>
-            </a:r>
-          </a:p>
-          <a:p>
-            <a:r>
-              <a:rPr lang="en-US" dirty="0" smtClean="0"/>
-              <a:t>Google Maps API for Job Search</a:t>
-            </a:r>
-          </a:p>
-          <a:p>
-            <a:r>
-              <a:rPr lang="en-US" dirty="0" smtClean="0"/>
               <a:t>Contact Admin</a:t>
             </a:r>
-          </a:p>
-          <a:p>
             <a:endParaRPr lang="en-US" dirty="0" smtClean="0"/>
-          </a:p>
-          <a:p>
-            <a:r>
-              <a:rPr lang="en-US" dirty="0" smtClean="0"/>
-              <a:t>Message Sharing System (ex. “A user has accepted your job!”)</a:t>
-            </a:r>
           </a:p>
           <a:p>
             <a:r>

</xml_diff>

<commit_message>
Committed presentation for Spiral 3. Changes include new 'Capabilities' slide as well as minor changes throughout
</commit_message>
<xml_diff>
--- a/Presentation/Spiral3.pptx
+++ b/Presentation/Spiral3.pptx
@@ -10,7 +10,8 @@
     <p:sldId id="258" r:id="rId4"/>
     <p:sldId id="260" r:id="rId5"/>
     <p:sldId id="259" r:id="rId6"/>
-    <p:sldId id="261" r:id="rId7"/>
+    <p:sldId id="262" r:id="rId7"/>
+    <p:sldId id="261" r:id="rId8"/>
   </p:sldIdLst>
   <p:sldSz cx="12192000" cy="6858000"/>
   <p:notesSz cx="6858000" cy="9144000"/>
@@ -6413,7 +6414,6 @@
               <a:rPr lang="en-US" dirty="0" smtClean="0"/>
               <a:t>Admin Panel: Banning a user</a:t>
             </a:r>
-            <a:endParaRPr lang="en-US" dirty="0" smtClean="0"/>
           </a:p>
           <a:p>
             <a:r>
@@ -6436,11 +6436,7 @@
           <a:p>
             <a:r>
               <a:rPr lang="en-US" dirty="0" smtClean="0"/>
-              <a:t>View Past </a:t>
-            </a:r>
-            <a:r>
-              <a:rPr lang="en-US" dirty="0" smtClean="0"/>
-              <a:t>Reviews</a:t>
+              <a:t>View Past Reviews</a:t>
             </a:r>
           </a:p>
           <a:p>
@@ -6595,6 +6591,122 @@
           <a:p>
             <a:r>
               <a:rPr lang="en-US" dirty="0" smtClean="0"/>
+              <a:t>Current Capabilities</a:t>
+            </a:r>
+            <a:endParaRPr lang="en-US" dirty="0"/>
+          </a:p>
+        </p:txBody>
+      </p:sp>
+      <p:sp>
+        <p:nvSpPr>
+          <p:cNvPr id="3" name="Content Placeholder 2"/>
+          <p:cNvSpPr>
+            <a:spLocks noGrp="1"/>
+          </p:cNvSpPr>
+          <p:nvPr>
+            <p:ph idx="1"/>
+          </p:nvPr>
+        </p:nvSpPr>
+        <p:spPr/>
+        <p:txBody>
+          <a:bodyPr numCol="2">
+            <a:normAutofit lnSpcReduction="10000"/>
+          </a:bodyPr>
+          <a:lstStyle/>
+          <a:p>
+            <a:r>
+              <a:rPr lang="en-US" dirty="0" smtClean="0"/>
+              <a:t>Users can search for nearby jobs by description and distance</a:t>
+            </a:r>
+          </a:p>
+          <a:p>
+            <a:r>
+              <a:rPr lang="en-US" dirty="0" smtClean="0"/>
+              <a:t>User contact and location information is secure</a:t>
+            </a:r>
+          </a:p>
+          <a:p>
+            <a:r>
+              <a:rPr lang="en-US" dirty="0" smtClean="0"/>
+              <a:t>Users can change their profile information with ease</a:t>
+            </a:r>
+          </a:p>
+          <a:p>
+            <a:r>
+              <a:rPr lang="en-US" dirty="0" smtClean="0"/>
+              <a:t>Administrator privileges are secure</a:t>
+            </a:r>
+          </a:p>
+          <a:p>
+            <a:r>
+              <a:rPr lang="en-US" dirty="0" smtClean="0"/>
+              <a:t>GUI is bright and colorful, and easy to interpret</a:t>
+            </a:r>
+          </a:p>
+          <a:p>
+            <a:r>
+              <a:rPr lang="en-US" dirty="0" smtClean="0"/>
+              <a:t>Ease of registration and job searching/requesting</a:t>
+            </a:r>
+          </a:p>
+          <a:p>
+            <a:r>
+              <a:rPr lang="en-US" dirty="0" smtClean="0"/>
+              <a:t>This basic framework can be expanded for many different types of services</a:t>
+            </a:r>
+          </a:p>
+          <a:p>
+            <a:endParaRPr lang="en-US" dirty="0"/>
+          </a:p>
+        </p:txBody>
+      </p:sp>
+    </p:spTree>
+    <p:extLst>
+      <p:ext uri="{BB962C8B-B14F-4D97-AF65-F5344CB8AC3E}">
+        <p14:creationId xmlns:p14="http://schemas.microsoft.com/office/powerpoint/2010/main" val="732394536"/>
+      </p:ext>
+    </p:extLst>
+  </p:cSld>
+  <p:clrMapOvr>
+    <a:masterClrMapping/>
+  </p:clrMapOvr>
+</p:sld>
+</file>
+
+<file path=ppt/slides/slide7.xml><?xml version="1.0" encoding="utf-8"?>
+<p:sld xmlns:a="http://schemas.openxmlformats.org/drawingml/2006/main" xmlns:r="http://schemas.openxmlformats.org/officeDocument/2006/relationships" xmlns:p="http://schemas.openxmlformats.org/presentationml/2006/main">
+  <p:cSld>
+    <p:spTree>
+      <p:nvGrpSpPr>
+        <p:cNvPr id="1" name=""/>
+        <p:cNvGrpSpPr/>
+        <p:nvPr/>
+      </p:nvGrpSpPr>
+      <p:grpSpPr>
+        <a:xfrm>
+          <a:off x="0" y="0"/>
+          <a:ext cx="0" cy="0"/>
+          <a:chOff x="0" y="0"/>
+          <a:chExt cx="0" cy="0"/>
+        </a:xfrm>
+      </p:grpSpPr>
+      <p:sp>
+        <p:nvSpPr>
+          <p:cNvPr id="2" name="Title 1"/>
+          <p:cNvSpPr>
+            <a:spLocks noGrp="1"/>
+          </p:cNvSpPr>
+          <p:nvPr>
+            <p:ph type="title"/>
+          </p:nvPr>
+        </p:nvSpPr>
+        <p:spPr/>
+        <p:txBody>
+          <a:bodyPr/>
+          <a:lstStyle/>
+          <a:p>
+            <a:r>
+              <a:rPr lang="en-US" dirty="0" smtClean="0"/>
               <a:t>To Do List</a:t>
             </a:r>
             <a:endParaRPr lang="en-US" dirty="0"/>
@@ -6620,21 +6732,23 @@
           <a:p>
             <a:r>
               <a:rPr lang="en-US" dirty="0" smtClean="0"/>
-              <a:t>Contact Admin</a:t>
+              <a:t>PayPal </a:t>
+            </a:r>
+            <a:r>
+              <a:rPr lang="en-US" dirty="0" smtClean="0"/>
+              <a:t>Sandbox(?)</a:t>
+            </a:r>
+          </a:p>
+          <a:p>
+            <a:r>
+              <a:rPr lang="en-US" dirty="0" smtClean="0"/>
+              <a:t>Minor </a:t>
+            </a:r>
+            <a:r>
+              <a:rPr lang="en-US" smtClean="0"/>
+              <a:t>HTML/CSS changes</a:t>
             </a:r>
             <a:endParaRPr lang="en-US" dirty="0" smtClean="0"/>
-          </a:p>
-          <a:p>
-            <a:r>
-              <a:rPr lang="en-US" dirty="0" smtClean="0"/>
-              <a:t>PayPal Sandbox(?)</a:t>
-            </a:r>
-          </a:p>
-          <a:p>
-            <a:r>
-              <a:rPr lang="en-US" dirty="0" smtClean="0"/>
-              <a:t>Other small fixes and changes</a:t>
-            </a:r>
           </a:p>
         </p:txBody>
       </p:sp>

</xml_diff>

<commit_message>
Finalized Presentation for Spiral 3
</commit_message>
<xml_diff>
--- a/Presentation/Spiral3.pptx
+++ b/Presentation/Spiral3.pptx
@@ -11,7 +11,6 @@
     <p:sldId id="260" r:id="rId5"/>
     <p:sldId id="259" r:id="rId6"/>
     <p:sldId id="262" r:id="rId7"/>
-    <p:sldId id="261" r:id="rId8"/>
   </p:sldIdLst>
   <p:sldSz cx="12192000" cy="6858000"/>
   <p:notesSz cx="6858000" cy="9144000"/>
@@ -6382,13 +6381,11 @@
           <a:p>
             <a:r>
               <a:rPr lang="en-US" dirty="0" smtClean="0"/>
-              <a:t>Register a User</a:t>
-            </a:r>
-          </a:p>
-          <a:p>
+              <a:t>User </a:t>
+            </a:r>
             <a:r>
               <a:rPr lang="en-US" dirty="0" smtClean="0"/>
-              <a:t>User Login</a:t>
+              <a:t>Login</a:t>
             </a:r>
           </a:p>
           <a:p>
@@ -6400,19 +6397,29 @@
           <a:p>
             <a:r>
               <a:rPr lang="en-US" dirty="0" smtClean="0"/>
-              <a:t>View Homepage</a:t>
-            </a:r>
-          </a:p>
-          <a:p>
+              <a:t>View </a:t>
+            </a:r>
             <a:r>
               <a:rPr lang="en-US" dirty="0" smtClean="0"/>
-              <a:t>Create Second User</a:t>
+              <a:t>Homepage</a:t>
             </a:r>
           </a:p>
           <a:p>
             <a:r>
               <a:rPr lang="en-US" dirty="0" smtClean="0"/>
-              <a:t>Admin Panel: Banning a user</a:t>
+              <a:t>Admin Panel and </a:t>
+            </a:r>
+            <a:r>
+              <a:rPr lang="en-US" dirty="0" smtClean="0"/>
+              <a:t>B</a:t>
+            </a:r>
+            <a:r>
+              <a:rPr lang="en-US" dirty="0" smtClean="0"/>
+              <a:t>anning </a:t>
+            </a:r>
+            <a:r>
+              <a:rPr lang="en-US" dirty="0" smtClean="0"/>
+              <a:t>a user</a:t>
             </a:r>
           </a:p>
           <a:p>
@@ -6442,8 +6449,9 @@
           <a:p>
             <a:r>
               <a:rPr lang="en-US" dirty="0" smtClean="0"/>
-              <a:t>Google Maps Searching</a:t>
-            </a:r>
+              <a:t>Searching based on Job Description and Distance</a:t>
+            </a:r>
+            <a:endParaRPr lang="en-US" dirty="0" smtClean="0"/>
           </a:p>
           <a:p>
             <a:r>
@@ -6664,98 +6672,6 @@
     <p:extLst>
       <p:ext uri="{BB962C8B-B14F-4D97-AF65-F5344CB8AC3E}">
         <p14:creationId xmlns:p14="http://schemas.microsoft.com/office/powerpoint/2010/main" val="732394536"/>
-      </p:ext>
-    </p:extLst>
-  </p:cSld>
-  <p:clrMapOvr>
-    <a:masterClrMapping/>
-  </p:clrMapOvr>
-</p:sld>
-</file>
-
-<file path=ppt/slides/slide7.xml><?xml version="1.0" encoding="utf-8"?>
-<p:sld xmlns:a="http://schemas.openxmlformats.org/drawingml/2006/main" xmlns:r="http://schemas.openxmlformats.org/officeDocument/2006/relationships" xmlns:p="http://schemas.openxmlformats.org/presentationml/2006/main">
-  <p:cSld>
-    <p:spTree>
-      <p:nvGrpSpPr>
-        <p:cNvPr id="1" name=""/>
-        <p:cNvGrpSpPr/>
-        <p:nvPr/>
-      </p:nvGrpSpPr>
-      <p:grpSpPr>
-        <a:xfrm>
-          <a:off x="0" y="0"/>
-          <a:ext cx="0" cy="0"/>
-          <a:chOff x="0" y="0"/>
-          <a:chExt cx="0" cy="0"/>
-        </a:xfrm>
-      </p:grpSpPr>
-      <p:sp>
-        <p:nvSpPr>
-          <p:cNvPr id="2" name="Title 1"/>
-          <p:cNvSpPr>
-            <a:spLocks noGrp="1"/>
-          </p:cNvSpPr>
-          <p:nvPr>
-            <p:ph type="title"/>
-          </p:nvPr>
-        </p:nvSpPr>
-        <p:spPr/>
-        <p:txBody>
-          <a:bodyPr/>
-          <a:lstStyle/>
-          <a:p>
-            <a:r>
-              <a:rPr lang="en-US" dirty="0" smtClean="0"/>
-              <a:t>To Do List</a:t>
-            </a:r>
-            <a:endParaRPr lang="en-US" dirty="0"/>
-          </a:p>
-        </p:txBody>
-      </p:sp>
-      <p:sp>
-        <p:nvSpPr>
-          <p:cNvPr id="3" name="Content Placeholder 2"/>
-          <p:cNvSpPr>
-            <a:spLocks noGrp="1"/>
-          </p:cNvSpPr>
-          <p:nvPr>
-            <p:ph idx="1"/>
-          </p:nvPr>
-        </p:nvSpPr>
-        <p:spPr/>
-        <p:txBody>
-          <a:bodyPr numCol="2">
-            <a:normAutofit/>
-          </a:bodyPr>
-          <a:lstStyle/>
-          <a:p>
-            <a:r>
-              <a:rPr lang="en-US" dirty="0" smtClean="0"/>
-              <a:t>PayPal </a:t>
-            </a:r>
-            <a:r>
-              <a:rPr lang="en-US" dirty="0" smtClean="0"/>
-              <a:t>Sandbox(?)</a:t>
-            </a:r>
-          </a:p>
-          <a:p>
-            <a:r>
-              <a:rPr lang="en-US" dirty="0" smtClean="0"/>
-              <a:t>Minor </a:t>
-            </a:r>
-            <a:r>
-              <a:rPr lang="en-US" smtClean="0"/>
-              <a:t>HTML/CSS changes</a:t>
-            </a:r>
-            <a:endParaRPr lang="en-US" dirty="0" smtClean="0"/>
-          </a:p>
-        </p:txBody>
-      </p:sp>
-    </p:spTree>
-    <p:extLst>
-      <p:ext uri="{BB962C8B-B14F-4D97-AF65-F5344CB8AC3E}">
-        <p14:creationId xmlns:p14="http://schemas.microsoft.com/office/powerpoint/2010/main" val="1462073346"/>
       </p:ext>
     </p:extLst>
   </p:cSld>

</xml_diff>